<commit_message>
small fixes to lectures...
</commit_message>
<xml_diff>
--- a/classes/stats2015/Lecture10.pptx
+++ b/classes/stats2015/Lecture10.pptx
@@ -221,7 +221,7 @@
             <a:fld id="{AABD6A49-7987-48E0-90DF-8C2FFA45CE95}" type="datetimeFigureOut">
               <a:rPr lang="en-US" smtClean="0"/>
               <a:pPr/>
-              <a:t>2/21/2015</a:t>
+              <a:t>2/23/2015</a:t>
             </a:fld>
             <a:endParaRPr lang="en-US"/>
           </a:p>
@@ -1161,7 +1161,7 @@
             <a:fld id="{1D8BD707-D9CF-40AE-B4C6-C98DA3205C09}" type="datetimeFigureOut">
               <a:rPr lang="en-US" smtClean="0"/>
               <a:pPr/>
-              <a:t>2/21/2015</a:t>
+              <a:t>2/23/2015</a:t>
             </a:fld>
             <a:endParaRPr lang="en-US"/>
           </a:p>
@@ -1328,7 +1328,7 @@
             <a:fld id="{1D8BD707-D9CF-40AE-B4C6-C98DA3205C09}" type="datetimeFigureOut">
               <a:rPr lang="en-US" smtClean="0"/>
               <a:pPr/>
-              <a:t>2/21/2015</a:t>
+              <a:t>2/23/2015</a:t>
             </a:fld>
             <a:endParaRPr lang="en-US"/>
           </a:p>
@@ -1505,7 +1505,7 @@
             <a:fld id="{1D8BD707-D9CF-40AE-B4C6-C98DA3205C09}" type="datetimeFigureOut">
               <a:rPr lang="en-US" smtClean="0"/>
               <a:pPr/>
-              <a:t>2/21/2015</a:t>
+              <a:t>2/23/2015</a:t>
             </a:fld>
             <a:endParaRPr lang="en-US"/>
           </a:p>
@@ -1672,7 +1672,7 @@
             <a:fld id="{1D8BD707-D9CF-40AE-B4C6-C98DA3205C09}" type="datetimeFigureOut">
               <a:rPr lang="en-US" smtClean="0"/>
               <a:pPr/>
-              <a:t>2/21/2015</a:t>
+              <a:t>2/23/2015</a:t>
             </a:fld>
             <a:endParaRPr lang="en-US"/>
           </a:p>
@@ -1915,7 +1915,7 @@
             <a:fld id="{1D8BD707-D9CF-40AE-B4C6-C98DA3205C09}" type="datetimeFigureOut">
               <a:rPr lang="en-US" smtClean="0"/>
               <a:pPr/>
-              <a:t>2/21/2015</a:t>
+              <a:t>2/23/2015</a:t>
             </a:fld>
             <a:endParaRPr lang="en-US"/>
           </a:p>
@@ -2200,7 +2200,7 @@
             <a:fld id="{1D8BD707-D9CF-40AE-B4C6-C98DA3205C09}" type="datetimeFigureOut">
               <a:rPr lang="en-US" smtClean="0"/>
               <a:pPr/>
-              <a:t>2/21/2015</a:t>
+              <a:t>2/23/2015</a:t>
             </a:fld>
             <a:endParaRPr lang="en-US"/>
           </a:p>
@@ -2619,7 +2619,7 @@
             <a:fld id="{1D8BD707-D9CF-40AE-B4C6-C98DA3205C09}" type="datetimeFigureOut">
               <a:rPr lang="en-US" smtClean="0"/>
               <a:pPr/>
-              <a:t>2/21/2015</a:t>
+              <a:t>2/23/2015</a:t>
             </a:fld>
             <a:endParaRPr lang="en-US"/>
           </a:p>
@@ -2734,7 +2734,7 @@
             <a:fld id="{1D8BD707-D9CF-40AE-B4C6-C98DA3205C09}" type="datetimeFigureOut">
               <a:rPr lang="en-US" smtClean="0"/>
               <a:pPr/>
-              <a:t>2/21/2015</a:t>
+              <a:t>2/23/2015</a:t>
             </a:fld>
             <a:endParaRPr lang="en-US"/>
           </a:p>
@@ -2826,7 +2826,7 @@
             <a:fld id="{1D8BD707-D9CF-40AE-B4C6-C98DA3205C09}" type="datetimeFigureOut">
               <a:rPr lang="en-US" smtClean="0"/>
               <a:pPr/>
-              <a:t>2/21/2015</a:t>
+              <a:t>2/23/2015</a:t>
             </a:fld>
             <a:endParaRPr lang="en-US"/>
           </a:p>
@@ -3100,7 +3100,7 @@
             <a:fld id="{1D8BD707-D9CF-40AE-B4C6-C98DA3205C09}" type="datetimeFigureOut">
               <a:rPr lang="en-US" smtClean="0"/>
               <a:pPr/>
-              <a:t>2/21/2015</a:t>
+              <a:t>2/23/2015</a:t>
             </a:fld>
             <a:endParaRPr lang="en-US"/>
           </a:p>
@@ -3350,7 +3350,7 @@
             <a:fld id="{1D8BD707-D9CF-40AE-B4C6-C98DA3205C09}" type="datetimeFigureOut">
               <a:rPr lang="en-US" smtClean="0"/>
               <a:pPr/>
-              <a:t>2/21/2015</a:t>
+              <a:t>2/23/2015</a:t>
             </a:fld>
             <a:endParaRPr lang="en-US"/>
           </a:p>
@@ -3560,7 +3560,7 @@
             <a:fld id="{1D8BD707-D9CF-40AE-B4C6-C98DA3205C09}" type="datetimeFigureOut">
               <a:rPr lang="en-US" smtClean="0"/>
               <a:pPr/>
-              <a:t>2/21/2015</a:t>
+              <a:t>2/23/2015</a:t>
             </a:fld>
             <a:endParaRPr lang="en-US"/>
           </a:p>
@@ -5375,18 +5375,14 @@
           <a:lstStyle/>
           <a:p>
             <a:r>
-              <a:rPr lang="en-US" dirty="0" err="1" smtClean="0"/>
-              <a:t>i</a:t>
-            </a:r>
-            <a:r>
-              <a:rPr lang="en-US" dirty="0" smtClean="0"/>
-              <a:t> is an index for samples (columns in our spreadsheet)</a:t>
-            </a:r>
-          </a:p>
-          <a:p>
-            <a:r>
-              <a:rPr lang="en-US" dirty="0" smtClean="0"/>
-              <a:t>J is an index for genes (rows in our </a:t>
+              <a:rPr lang="en-US" dirty="0" smtClean="0"/>
+              <a:t>j is an index for samples (columns in our spreadsheet)</a:t>
+            </a:r>
+          </a:p>
+          <a:p>
+            <a:r>
+              <a:rPr lang="en-US" dirty="0" smtClean="0"/>
+              <a:t>i is an index for genes (rows in our </a:t>
             </a:r>
             <a:r>
               <a:rPr lang="en-US" dirty="0" err="1" smtClean="0"/>
@@ -8447,11 +8443,7 @@
           <a:p>
             <a:r>
               <a:rPr lang="en-US" dirty="0" smtClean="0"/>
-              <a:t>in the next lecture</a:t>
-            </a:r>
-            <a:r>
-              <a:rPr lang="en-US" dirty="0" smtClean="0"/>
-              <a:t>…</a:t>
+              <a:t>in the next lecture…</a:t>
             </a:r>
           </a:p>
           <a:p>
@@ -8474,7 +8466,6 @@
               <a:rPr lang="en-US" dirty="0" smtClean="0"/>
               <a:t>that we will see..</a:t>
             </a:r>
-            <a:endParaRPr lang="en-US" dirty="0" smtClean="0"/>
           </a:p>
           <a:p>
             <a:endParaRPr lang="en-US" dirty="0" smtClean="0"/>
@@ -8554,11 +8545,7 @@
           <a:p>
             <a:r>
               <a:rPr lang="en-US" dirty="0" smtClean="0"/>
-              <a:t>	</a:t>
-            </a:r>
-            <a:r>
-              <a:rPr lang="en-US" dirty="0" smtClean="0"/>
-              <a:t>What are the different ways the variance can get calculated in </a:t>
+              <a:t>	What are the different ways the variance can get calculated in </a:t>
             </a:r>
             <a:r>
               <a:rPr lang="en-US" dirty="0" err="1" smtClean="0"/>
@@ -8568,7 +8555,6 @@
               <a:rPr lang="en-US" dirty="0" smtClean="0"/>
               <a:t>?</a:t>
             </a:r>
-            <a:endParaRPr lang="en-US" dirty="0" smtClean="0"/>
           </a:p>
           <a:p>
             <a:endParaRPr lang="en-US" dirty="0" smtClean="0"/>

</xml_diff>

<commit_message>
small fix to lecture..
</commit_message>
<xml_diff>
--- a/classes/stats2015/Lecture10.pptx
+++ b/classes/stats2015/Lecture10.pptx
@@ -6742,7 +6742,7 @@
         </p:nvSpPr>
         <p:spPr>
           <a:xfrm>
-            <a:off x="228600" y="0"/>
+            <a:off x="228600" y="-76200"/>
             <a:ext cx="8478679" cy="7239000"/>
           </a:xfrm>
           <a:prstGeom prst="rect">
@@ -7282,16 +7282,53 @@
                 <a:latin typeface="Courier New" pitchFamily="49" charset="0"/>
                 <a:cs typeface="Courier New" pitchFamily="49" charset="0"/>
               </a:rPr>
-              <a:t>[j]</a:t>
-            </a:r>
-          </a:p>
-          <a:p>
+              <a:t>[j</a:t>
+            </a:r>
             <a:r>
               <a:rPr lang="en-US" sz="1200" dirty="0" smtClean="0">
                 <a:latin typeface="Courier New" pitchFamily="49" charset="0"/>
                 <a:cs typeface="Courier New" pitchFamily="49" charset="0"/>
               </a:rPr>
-              <a:t>			</a:t>
+              <a:t>]</a:t>
+            </a:r>
+            <a:r>
+              <a:rPr lang="en-US" sz="1200" dirty="0" smtClean="0">
+                <a:latin typeface="Courier New" pitchFamily="49" charset="0"/>
+                <a:cs typeface="Courier New" pitchFamily="49" charset="0"/>
+              </a:rPr>
+              <a:t>	</a:t>
+            </a:r>
+          </a:p>
+          <a:p>
+            <a:r>
+              <a:rPr lang="en-US" sz="1200" dirty="0" smtClean="0">
+                <a:latin typeface="Courier New" pitchFamily="49" charset="0"/>
+                <a:cs typeface="Courier New" pitchFamily="49" charset="0"/>
+              </a:rPr>
+              <a:t>		</a:t>
+            </a:r>
+            <a:r>
+              <a:rPr lang="en-US" sz="1200" dirty="0" smtClean="0">
+                <a:latin typeface="Courier New" pitchFamily="49" charset="0"/>
+                <a:cs typeface="Courier New" pitchFamily="49" charset="0"/>
+              </a:rPr>
+              <a:t>}</a:t>
+            </a:r>
+          </a:p>
+          <a:p>
+            <a:r>
+              <a:rPr lang="en-US" sz="1200" dirty="0" smtClean="0">
+                <a:latin typeface="Courier New" pitchFamily="49" charset="0"/>
+                <a:cs typeface="Courier New" pitchFamily="49" charset="0"/>
+              </a:rPr>
+              <a:t>	</a:t>
+            </a:r>
+            <a:r>
+              <a:rPr lang="en-US" sz="1200" dirty="0" smtClean="0">
+                <a:latin typeface="Courier New" pitchFamily="49" charset="0"/>
+                <a:cs typeface="Courier New" pitchFamily="49" charset="0"/>
+              </a:rPr>
+              <a:t>	</a:t>
             </a:r>
             <a:r>
               <a:rPr lang="en-US" sz="1200" dirty="0" err="1" smtClean="0">
@@ -7321,15 +7358,10 @@
               </a:rPr>
               <a:t>] = sum / length(range);</a:t>
             </a:r>
-          </a:p>
-          <a:p>
-            <a:r>
-              <a:rPr lang="en-US" sz="1200" dirty="0" smtClean="0">
-                <a:latin typeface="Courier New" pitchFamily="49" charset="0"/>
-                <a:cs typeface="Courier New" pitchFamily="49" charset="0"/>
-              </a:rPr>
-              <a:t>		}</a:t>
-            </a:r>
+            <a:endParaRPr lang="en-US" sz="1200" dirty="0" smtClean="0">
+              <a:latin typeface="Courier New" pitchFamily="49" charset="0"/>
+              <a:cs typeface="Courier New" pitchFamily="49" charset="0"/>
+            </a:endParaRPr>
           </a:p>
           <a:p>
             <a:r>

</xml_diff>

<commit_message>
Another small bug fix to the code in Lecture 10
</commit_message>
<xml_diff>
--- a/classes/stats2015/Lecture10.pptx
+++ b/classes/stats2015/Lecture10.pptx
@@ -6841,8 +6841,19 @@
                 <a:latin typeface="Courier New" pitchFamily="49" charset="0"/>
                 <a:cs typeface="Courier New" pitchFamily="49" charset="0"/>
               </a:rPr>
-              <a:t> &lt;- 7:10</a:t>
-            </a:r>
+              <a:t> &lt;- </a:t>
+            </a:r>
+            <a:r>
+              <a:rPr lang="en-US" sz="1200" dirty="0" smtClean="0">
+                <a:latin typeface="Courier New" pitchFamily="49" charset="0"/>
+                <a:cs typeface="Courier New" pitchFamily="49" charset="0"/>
+              </a:rPr>
+              <a:t>7:11</a:t>
+            </a:r>
+            <a:endParaRPr lang="en-US" sz="1200" dirty="0" smtClean="0">
+              <a:latin typeface="Courier New" pitchFamily="49" charset="0"/>
+              <a:cs typeface="Courier New" pitchFamily="49" charset="0"/>
+            </a:endParaRPr>
           </a:p>
           <a:p>
             <a:endParaRPr lang="en-US" sz="1200" dirty="0" smtClean="0">
@@ -7282,21 +7293,16 @@
                 <a:latin typeface="Courier New" pitchFamily="49" charset="0"/>
                 <a:cs typeface="Courier New" pitchFamily="49" charset="0"/>
               </a:rPr>
-              <a:t>[j</a:t>
-            </a:r>
+              <a:t>[j]	</a:t>
+            </a:r>
+          </a:p>
+          <a:p>
             <a:r>
               <a:rPr lang="en-US" sz="1200" dirty="0" smtClean="0">
                 <a:latin typeface="Courier New" pitchFamily="49" charset="0"/>
                 <a:cs typeface="Courier New" pitchFamily="49" charset="0"/>
               </a:rPr>
-              <a:t>]</a:t>
-            </a:r>
-            <a:r>
-              <a:rPr lang="en-US" sz="1200" dirty="0" smtClean="0">
-                <a:latin typeface="Courier New" pitchFamily="49" charset="0"/>
-                <a:cs typeface="Courier New" pitchFamily="49" charset="0"/>
-              </a:rPr>
-              <a:t>	</a:t>
+              <a:t>		}</a:t>
             </a:r>
           </a:p>
           <a:p>
@@ -7308,29 +7314,6 @@
               <a:t>		</a:t>
             </a:r>
             <a:r>
-              <a:rPr lang="en-US" sz="1200" dirty="0" smtClean="0">
-                <a:latin typeface="Courier New" pitchFamily="49" charset="0"/>
-                <a:cs typeface="Courier New" pitchFamily="49" charset="0"/>
-              </a:rPr>
-              <a:t>}</a:t>
-            </a:r>
-          </a:p>
-          <a:p>
-            <a:r>
-              <a:rPr lang="en-US" sz="1200" dirty="0" smtClean="0">
-                <a:latin typeface="Courier New" pitchFamily="49" charset="0"/>
-                <a:cs typeface="Courier New" pitchFamily="49" charset="0"/>
-              </a:rPr>
-              <a:t>	</a:t>
-            </a:r>
-            <a:r>
-              <a:rPr lang="en-US" sz="1200" dirty="0" smtClean="0">
-                <a:latin typeface="Courier New" pitchFamily="49" charset="0"/>
-                <a:cs typeface="Courier New" pitchFamily="49" charset="0"/>
-              </a:rPr>
-              <a:t>	</a:t>
-            </a:r>
-            <a:r>
               <a:rPr lang="en-US" sz="1200" dirty="0" err="1" smtClean="0">
                 <a:latin typeface="Courier New" pitchFamily="49" charset="0"/>
                 <a:cs typeface="Courier New" pitchFamily="49" charset="0"/>
@@ -7358,10 +7341,6 @@
               </a:rPr>
               <a:t>] = sum / length(range);</a:t>
             </a:r>
-            <a:endParaRPr lang="en-US" sz="1200" dirty="0" smtClean="0">
-              <a:latin typeface="Courier New" pitchFamily="49" charset="0"/>
-              <a:cs typeface="Courier New" pitchFamily="49" charset="0"/>
-            </a:endParaRPr>
           </a:p>
           <a:p>
             <a:r>

</xml_diff>